<commit_message>
corecciones en la figura de histogramas del experimento de recableado
</commit_message>
<xml_diff>
--- a/Appendices/rewiring_histograms.pptx
+++ b/Appendices/rewiring_histograms.pptx
@@ -4,11 +4,15 @@
   <p:sldMasterIdLst>
     <p:sldMasterId id="2147483648" r:id="rId1"/>
   </p:sldMasterIdLst>
+  <p:notesMasterIdLst>
+    <p:notesMasterId r:id="rId4"/>
+  </p:notesMasterIdLst>
   <p:sldIdLst>
     <p:sldId id="256" r:id="rId2"/>
+    <p:sldId id="257" r:id="rId3"/>
   </p:sldIdLst>
   <p:sldSz cx="9144000" cy="6858000" type="screen4x3"/>
-  <p:notesSz cx="6858000" cy="9144000"/>
+  <p:notesSz cx="7099300" cy="10234613"/>
   <p:defaultTextStyle>
     <a:defPPr>
       <a:defRPr lang="es-ES"/>
@@ -107,6 +111,440 @@
 </p:presentation>
 </file>
 
+<file path=ppt/notesMasters/notesMaster1.xml><?xml version="1.0" encoding="utf-8"?>
+<p:notesMaster xmlns:a="http://schemas.openxmlformats.org/drawingml/2006/main" xmlns:r="http://schemas.openxmlformats.org/officeDocument/2006/relationships" xmlns:p="http://schemas.openxmlformats.org/presentationml/2006/main">
+  <p:cSld>
+    <p:bg>
+      <p:bgRef idx="1001">
+        <a:schemeClr val="bg1"/>
+      </p:bgRef>
+    </p:bg>
+    <p:spTree>
+      <p:nvGrpSpPr>
+        <p:cNvPr id="1" name=""/>
+        <p:cNvGrpSpPr/>
+        <p:nvPr/>
+      </p:nvGrpSpPr>
+      <p:grpSpPr>
+        <a:xfrm>
+          <a:off x="0" y="0"/>
+          <a:ext cx="0" cy="0"/>
+          <a:chOff x="0" y="0"/>
+          <a:chExt cx="0" cy="0"/>
+        </a:xfrm>
+      </p:grpSpPr>
+      <p:sp>
+        <p:nvSpPr>
+          <p:cNvPr id="2" name="1 Marcador de encabezado"/>
+          <p:cNvSpPr>
+            <a:spLocks noGrp="1"/>
+          </p:cNvSpPr>
+          <p:nvPr>
+            <p:ph type="hdr" sz="quarter"/>
+          </p:nvPr>
+        </p:nvSpPr>
+        <p:spPr>
+          <a:xfrm>
+            <a:off x="0" y="0"/>
+            <a:ext cx="3076575" cy="511175"/>
+          </a:xfrm>
+          <a:prstGeom prst="rect">
+            <a:avLst/>
+          </a:prstGeom>
+        </p:spPr>
+        <p:txBody>
+          <a:bodyPr vert="horz" lIns="91440" tIns="45720" rIns="91440" bIns="45720" rtlCol="0"/>
+          <a:lstStyle>
+            <a:lvl1pPr algn="l">
+              <a:defRPr sz="1200"/>
+            </a:lvl1pPr>
+          </a:lstStyle>
+          <a:p>
+            <a:endParaRPr lang="es-ES"/>
+          </a:p>
+        </p:txBody>
+      </p:sp>
+      <p:sp>
+        <p:nvSpPr>
+          <p:cNvPr id="3" name="2 Marcador de fecha"/>
+          <p:cNvSpPr>
+            <a:spLocks noGrp="1"/>
+          </p:cNvSpPr>
+          <p:nvPr>
+            <p:ph type="dt" idx="1"/>
+          </p:nvPr>
+        </p:nvSpPr>
+        <p:spPr>
+          <a:xfrm>
+            <a:off x="4021138" y="0"/>
+            <a:ext cx="3076575" cy="511175"/>
+          </a:xfrm>
+          <a:prstGeom prst="rect">
+            <a:avLst/>
+          </a:prstGeom>
+        </p:spPr>
+        <p:txBody>
+          <a:bodyPr vert="horz" lIns="91440" tIns="45720" rIns="91440" bIns="45720" rtlCol="0"/>
+          <a:lstStyle>
+            <a:lvl1pPr algn="r">
+              <a:defRPr sz="1200"/>
+            </a:lvl1pPr>
+          </a:lstStyle>
+          <a:p>
+            <a:fld id="{002D2B1B-31AE-472B-BF57-97091B58EEA2}" type="datetimeFigureOut">
+              <a:rPr lang="es-ES" smtClean="0"/>
+              <a:t>03/07/2016</a:t>
+            </a:fld>
+            <a:endParaRPr lang="es-ES"/>
+          </a:p>
+        </p:txBody>
+      </p:sp>
+      <p:sp>
+        <p:nvSpPr>
+          <p:cNvPr id="4" name="3 Marcador de imagen de diapositiva"/>
+          <p:cNvSpPr>
+            <a:spLocks noGrp="1" noRot="1" noChangeAspect="1"/>
+          </p:cNvSpPr>
+          <p:nvPr>
+            <p:ph type="sldImg" idx="2"/>
+          </p:nvPr>
+        </p:nvSpPr>
+        <p:spPr>
+          <a:xfrm>
+            <a:off x="992188" y="768350"/>
+            <a:ext cx="5114925" cy="3836988"/>
+          </a:xfrm>
+          <a:prstGeom prst="rect">
+            <a:avLst/>
+          </a:prstGeom>
+          <a:noFill/>
+          <a:ln w="12700">
+            <a:solidFill>
+              <a:prstClr val="black"/>
+            </a:solidFill>
+          </a:ln>
+        </p:spPr>
+        <p:txBody>
+          <a:bodyPr vert="horz" lIns="91440" tIns="45720" rIns="91440" bIns="45720" rtlCol="0" anchor="ctr"/>
+          <a:lstStyle/>
+          <a:p>
+            <a:endParaRPr lang="es-ES"/>
+          </a:p>
+        </p:txBody>
+      </p:sp>
+      <p:sp>
+        <p:nvSpPr>
+          <p:cNvPr id="5" name="4 Marcador de notas"/>
+          <p:cNvSpPr>
+            <a:spLocks noGrp="1"/>
+          </p:cNvSpPr>
+          <p:nvPr>
+            <p:ph type="body" sz="quarter" idx="3"/>
+          </p:nvPr>
+        </p:nvSpPr>
+        <p:spPr>
+          <a:xfrm>
+            <a:off x="709613" y="4860925"/>
+            <a:ext cx="5680075" cy="4605338"/>
+          </a:xfrm>
+          <a:prstGeom prst="rect">
+            <a:avLst/>
+          </a:prstGeom>
+        </p:spPr>
+        <p:txBody>
+          <a:bodyPr vert="horz" lIns="91440" tIns="45720" rIns="91440" bIns="45720" rtlCol="0"/>
+          <a:lstStyle/>
+          <a:p>
+            <a:pPr lvl="0"/>
+            <a:r>
+              <a:rPr lang="es-ES" smtClean="0"/>
+              <a:t>Haga clic para modificar el estilo de texto del patrón</a:t>
+            </a:r>
+          </a:p>
+          <a:p>
+            <a:pPr lvl="1"/>
+            <a:r>
+              <a:rPr lang="es-ES" smtClean="0"/>
+              <a:t>Segundo nivel</a:t>
+            </a:r>
+          </a:p>
+          <a:p>
+            <a:pPr lvl="2"/>
+            <a:r>
+              <a:rPr lang="es-ES" smtClean="0"/>
+              <a:t>Tercer nivel</a:t>
+            </a:r>
+          </a:p>
+          <a:p>
+            <a:pPr lvl="3"/>
+            <a:r>
+              <a:rPr lang="es-ES" smtClean="0"/>
+              <a:t>Cuarto nivel</a:t>
+            </a:r>
+          </a:p>
+          <a:p>
+            <a:pPr lvl="4"/>
+            <a:r>
+              <a:rPr lang="es-ES" smtClean="0"/>
+              <a:t>Quinto nivel</a:t>
+            </a:r>
+            <a:endParaRPr lang="es-ES"/>
+          </a:p>
+        </p:txBody>
+      </p:sp>
+      <p:sp>
+        <p:nvSpPr>
+          <p:cNvPr id="6" name="5 Marcador de pie de página"/>
+          <p:cNvSpPr>
+            <a:spLocks noGrp="1"/>
+          </p:cNvSpPr>
+          <p:nvPr>
+            <p:ph type="ftr" sz="quarter" idx="4"/>
+          </p:nvPr>
+        </p:nvSpPr>
+        <p:spPr>
+          <a:xfrm>
+            <a:off x="0" y="9721850"/>
+            <a:ext cx="3076575" cy="511175"/>
+          </a:xfrm>
+          <a:prstGeom prst="rect">
+            <a:avLst/>
+          </a:prstGeom>
+        </p:spPr>
+        <p:txBody>
+          <a:bodyPr vert="horz" lIns="91440" tIns="45720" rIns="91440" bIns="45720" rtlCol="0" anchor="b"/>
+          <a:lstStyle>
+            <a:lvl1pPr algn="l">
+              <a:defRPr sz="1200"/>
+            </a:lvl1pPr>
+          </a:lstStyle>
+          <a:p>
+            <a:endParaRPr lang="es-ES"/>
+          </a:p>
+        </p:txBody>
+      </p:sp>
+      <p:sp>
+        <p:nvSpPr>
+          <p:cNvPr id="7" name="6 Marcador de número de diapositiva"/>
+          <p:cNvSpPr>
+            <a:spLocks noGrp="1"/>
+          </p:cNvSpPr>
+          <p:nvPr>
+            <p:ph type="sldNum" sz="quarter" idx="5"/>
+          </p:nvPr>
+        </p:nvSpPr>
+        <p:spPr>
+          <a:xfrm>
+            <a:off x="4021138" y="9721850"/>
+            <a:ext cx="3076575" cy="511175"/>
+          </a:xfrm>
+          <a:prstGeom prst="rect">
+            <a:avLst/>
+          </a:prstGeom>
+        </p:spPr>
+        <p:txBody>
+          <a:bodyPr vert="horz" lIns="91440" tIns="45720" rIns="91440" bIns="45720" rtlCol="0" anchor="b"/>
+          <a:lstStyle>
+            <a:lvl1pPr algn="r">
+              <a:defRPr sz="1200"/>
+            </a:lvl1pPr>
+          </a:lstStyle>
+          <a:p>
+            <a:fld id="{AC332CDE-01BB-4619-8A0F-335EDD95972F}" type="slidenum">
+              <a:rPr lang="es-ES" smtClean="0"/>
+              <a:t>‹Nº›</a:t>
+            </a:fld>
+            <a:endParaRPr lang="es-ES"/>
+          </a:p>
+        </p:txBody>
+      </p:sp>
+    </p:spTree>
+    <p:extLst>
+      <p:ext uri="{BB962C8B-B14F-4D97-AF65-F5344CB8AC3E}">
+        <p14:creationId xmlns:p14="http://schemas.microsoft.com/office/powerpoint/2010/main" val="2174824139"/>
+      </p:ext>
+    </p:extLst>
+  </p:cSld>
+  <p:clrMap bg1="lt1" tx1="dk1" bg2="lt2" tx2="dk2" accent1="accent1" accent2="accent2" accent3="accent3" accent4="accent4" accent5="accent5" accent6="accent6" hlink="hlink" folHlink="folHlink"/>
+  <p:notesStyle>
+    <a:lvl1pPr marL="0" algn="l" defTabSz="914400" rtl="0" eaLnBrk="1" latinLnBrk="0" hangingPunct="1">
+      <a:defRPr sz="1200" kern="1200">
+        <a:solidFill>
+          <a:schemeClr val="tx1"/>
+        </a:solidFill>
+        <a:latin typeface="+mn-lt"/>
+        <a:ea typeface="+mn-ea"/>
+        <a:cs typeface="+mn-cs"/>
+      </a:defRPr>
+    </a:lvl1pPr>
+    <a:lvl2pPr marL="457200" algn="l" defTabSz="914400" rtl="0" eaLnBrk="1" latinLnBrk="0" hangingPunct="1">
+      <a:defRPr sz="1200" kern="1200">
+        <a:solidFill>
+          <a:schemeClr val="tx1"/>
+        </a:solidFill>
+        <a:latin typeface="+mn-lt"/>
+        <a:ea typeface="+mn-ea"/>
+        <a:cs typeface="+mn-cs"/>
+      </a:defRPr>
+    </a:lvl2pPr>
+    <a:lvl3pPr marL="914400" algn="l" defTabSz="914400" rtl="0" eaLnBrk="1" latinLnBrk="0" hangingPunct="1">
+      <a:defRPr sz="1200" kern="1200">
+        <a:solidFill>
+          <a:schemeClr val="tx1"/>
+        </a:solidFill>
+        <a:latin typeface="+mn-lt"/>
+        <a:ea typeface="+mn-ea"/>
+        <a:cs typeface="+mn-cs"/>
+      </a:defRPr>
+    </a:lvl3pPr>
+    <a:lvl4pPr marL="1371600" algn="l" defTabSz="914400" rtl="0" eaLnBrk="1" latinLnBrk="0" hangingPunct="1">
+      <a:defRPr sz="1200" kern="1200">
+        <a:solidFill>
+          <a:schemeClr val="tx1"/>
+        </a:solidFill>
+        <a:latin typeface="+mn-lt"/>
+        <a:ea typeface="+mn-ea"/>
+        <a:cs typeface="+mn-cs"/>
+      </a:defRPr>
+    </a:lvl4pPr>
+    <a:lvl5pPr marL="1828800" algn="l" defTabSz="914400" rtl="0" eaLnBrk="1" latinLnBrk="0" hangingPunct="1">
+      <a:defRPr sz="1200" kern="1200">
+        <a:solidFill>
+          <a:schemeClr val="tx1"/>
+        </a:solidFill>
+        <a:latin typeface="+mn-lt"/>
+        <a:ea typeface="+mn-ea"/>
+        <a:cs typeface="+mn-cs"/>
+      </a:defRPr>
+    </a:lvl5pPr>
+    <a:lvl6pPr marL="2286000" algn="l" defTabSz="914400" rtl="0" eaLnBrk="1" latinLnBrk="0" hangingPunct="1">
+      <a:defRPr sz="1200" kern="1200">
+        <a:solidFill>
+          <a:schemeClr val="tx1"/>
+        </a:solidFill>
+        <a:latin typeface="+mn-lt"/>
+        <a:ea typeface="+mn-ea"/>
+        <a:cs typeface="+mn-cs"/>
+      </a:defRPr>
+    </a:lvl6pPr>
+    <a:lvl7pPr marL="2743200" algn="l" defTabSz="914400" rtl="0" eaLnBrk="1" latinLnBrk="0" hangingPunct="1">
+      <a:defRPr sz="1200" kern="1200">
+        <a:solidFill>
+          <a:schemeClr val="tx1"/>
+        </a:solidFill>
+        <a:latin typeface="+mn-lt"/>
+        <a:ea typeface="+mn-ea"/>
+        <a:cs typeface="+mn-cs"/>
+      </a:defRPr>
+    </a:lvl7pPr>
+    <a:lvl8pPr marL="3200400" algn="l" defTabSz="914400" rtl="0" eaLnBrk="1" latinLnBrk="0" hangingPunct="1">
+      <a:defRPr sz="1200" kern="1200">
+        <a:solidFill>
+          <a:schemeClr val="tx1"/>
+        </a:solidFill>
+        <a:latin typeface="+mn-lt"/>
+        <a:ea typeface="+mn-ea"/>
+        <a:cs typeface="+mn-cs"/>
+      </a:defRPr>
+    </a:lvl8pPr>
+    <a:lvl9pPr marL="3657600" algn="l" defTabSz="914400" rtl="0" eaLnBrk="1" latinLnBrk="0" hangingPunct="1">
+      <a:defRPr sz="1200" kern="1200">
+        <a:solidFill>
+          <a:schemeClr val="tx1"/>
+        </a:solidFill>
+        <a:latin typeface="+mn-lt"/>
+        <a:ea typeface="+mn-ea"/>
+        <a:cs typeface="+mn-cs"/>
+      </a:defRPr>
+    </a:lvl9pPr>
+  </p:notesStyle>
+</p:notesMaster>
+</file>
+
+<file path=ppt/notesSlides/notesSlide1.xml><?xml version="1.0" encoding="utf-8"?>
+<p:notes xmlns:a="http://schemas.openxmlformats.org/drawingml/2006/main" xmlns:r="http://schemas.openxmlformats.org/officeDocument/2006/relationships" xmlns:p="http://schemas.openxmlformats.org/presentationml/2006/main">
+  <p:cSld>
+    <p:spTree>
+      <p:nvGrpSpPr>
+        <p:cNvPr id="1" name=""/>
+        <p:cNvGrpSpPr/>
+        <p:nvPr/>
+      </p:nvGrpSpPr>
+      <p:grpSpPr>
+        <a:xfrm>
+          <a:off x="0" y="0"/>
+          <a:ext cx="0" cy="0"/>
+          <a:chOff x="0" y="0"/>
+          <a:chExt cx="0" cy="0"/>
+        </a:xfrm>
+      </p:grpSpPr>
+      <p:sp>
+        <p:nvSpPr>
+          <p:cNvPr id="2" name="1 Marcador de imagen de diapositiva"/>
+          <p:cNvSpPr>
+            <a:spLocks noGrp="1" noRot="1" noChangeAspect="1"/>
+          </p:cNvSpPr>
+          <p:nvPr>
+            <p:ph type="sldImg"/>
+          </p:nvPr>
+        </p:nvSpPr>
+        <p:spPr/>
+      </p:sp>
+      <p:sp>
+        <p:nvSpPr>
+          <p:cNvPr id="3" name="2 Marcador de notas"/>
+          <p:cNvSpPr>
+            <a:spLocks noGrp="1"/>
+          </p:cNvSpPr>
+          <p:nvPr>
+            <p:ph type="body" idx="1"/>
+          </p:nvPr>
+        </p:nvSpPr>
+        <p:spPr/>
+        <p:txBody>
+          <a:bodyPr/>
+          <a:lstStyle/>
+          <a:p>
+            <a:endParaRPr lang="es-ES" dirty="0"/>
+          </a:p>
+        </p:txBody>
+      </p:sp>
+      <p:sp>
+        <p:nvSpPr>
+          <p:cNvPr id="4" name="3 Marcador de número de diapositiva"/>
+          <p:cNvSpPr>
+            <a:spLocks noGrp="1"/>
+          </p:cNvSpPr>
+          <p:nvPr>
+            <p:ph type="sldNum" sz="quarter" idx="10"/>
+          </p:nvPr>
+        </p:nvSpPr>
+        <p:spPr/>
+        <p:txBody>
+          <a:bodyPr/>
+          <a:lstStyle/>
+          <a:p>
+            <a:fld id="{AC332CDE-01BB-4619-8A0F-335EDD95972F}" type="slidenum">
+              <a:rPr lang="es-ES" smtClean="0"/>
+              <a:t>2</a:t>
+            </a:fld>
+            <a:endParaRPr lang="es-ES"/>
+          </a:p>
+        </p:txBody>
+      </p:sp>
+    </p:spTree>
+    <p:extLst>
+      <p:ext uri="{BB962C8B-B14F-4D97-AF65-F5344CB8AC3E}">
+        <p14:creationId xmlns:p14="http://schemas.microsoft.com/office/powerpoint/2010/main" val="2582783751"/>
+      </p:ext>
+    </p:extLst>
+  </p:cSld>
+  <p:clrMapOvr>
+    <a:masterClrMapping/>
+  </p:clrMapOvr>
+</p:notes>
+</file>
+
 <file path=ppt/slideLayouts/slideLayout1.xml><?xml version="1.0" encoding="utf-8"?>
 <p:sldLayout xmlns:a="http://schemas.openxmlformats.org/drawingml/2006/main" xmlns:r="http://schemas.openxmlformats.org/officeDocument/2006/relationships" xmlns:p="http://schemas.openxmlformats.org/presentationml/2006/main" type="title" preserve="1">
   <p:cSld name="Diapositiva de título">
@@ -288,7 +726,7 @@
           <a:p>
             <a:fld id="{F56AF053-A88D-4829-ACFF-9DF5CBA71A26}" type="datetimeFigureOut">
               <a:rPr lang="es-ES" smtClean="0"/>
-              <a:t>10/06/2016</a:t>
+              <a:t>03/07/2016</a:t>
             </a:fld>
             <a:endParaRPr lang="es-ES"/>
           </a:p>
@@ -458,7 +896,7 @@
           <a:p>
             <a:fld id="{F56AF053-A88D-4829-ACFF-9DF5CBA71A26}" type="datetimeFigureOut">
               <a:rPr lang="es-ES" smtClean="0"/>
-              <a:t>10/06/2016</a:t>
+              <a:t>03/07/2016</a:t>
             </a:fld>
             <a:endParaRPr lang="es-ES"/>
           </a:p>
@@ -638,7 +1076,7 @@
           <a:p>
             <a:fld id="{F56AF053-A88D-4829-ACFF-9DF5CBA71A26}" type="datetimeFigureOut">
               <a:rPr lang="es-ES" smtClean="0"/>
-              <a:t>10/06/2016</a:t>
+              <a:t>03/07/2016</a:t>
             </a:fld>
             <a:endParaRPr lang="es-ES"/>
           </a:p>
@@ -808,7 +1246,7 @@
           <a:p>
             <a:fld id="{F56AF053-A88D-4829-ACFF-9DF5CBA71A26}" type="datetimeFigureOut">
               <a:rPr lang="es-ES" smtClean="0"/>
-              <a:t>10/06/2016</a:t>
+              <a:t>03/07/2016</a:t>
             </a:fld>
             <a:endParaRPr lang="es-ES"/>
           </a:p>
@@ -1054,7 +1492,7 @@
           <a:p>
             <a:fld id="{F56AF053-A88D-4829-ACFF-9DF5CBA71A26}" type="datetimeFigureOut">
               <a:rPr lang="es-ES" smtClean="0"/>
-              <a:t>10/06/2016</a:t>
+              <a:t>03/07/2016</a:t>
             </a:fld>
             <a:endParaRPr lang="es-ES"/>
           </a:p>
@@ -1342,7 +1780,7 @@
           <a:p>
             <a:fld id="{F56AF053-A88D-4829-ACFF-9DF5CBA71A26}" type="datetimeFigureOut">
               <a:rPr lang="es-ES" smtClean="0"/>
-              <a:t>10/06/2016</a:t>
+              <a:t>03/07/2016</a:t>
             </a:fld>
             <a:endParaRPr lang="es-ES"/>
           </a:p>
@@ -1764,7 +2202,7 @@
           <a:p>
             <a:fld id="{F56AF053-A88D-4829-ACFF-9DF5CBA71A26}" type="datetimeFigureOut">
               <a:rPr lang="es-ES" smtClean="0"/>
-              <a:t>10/06/2016</a:t>
+              <a:t>03/07/2016</a:t>
             </a:fld>
             <a:endParaRPr lang="es-ES"/>
           </a:p>
@@ -1882,7 +2320,7 @@
           <a:p>
             <a:fld id="{F56AF053-A88D-4829-ACFF-9DF5CBA71A26}" type="datetimeFigureOut">
               <a:rPr lang="es-ES" smtClean="0"/>
-              <a:t>10/06/2016</a:t>
+              <a:t>03/07/2016</a:t>
             </a:fld>
             <a:endParaRPr lang="es-ES"/>
           </a:p>
@@ -1977,7 +2415,7 @@
           <a:p>
             <a:fld id="{F56AF053-A88D-4829-ACFF-9DF5CBA71A26}" type="datetimeFigureOut">
               <a:rPr lang="es-ES" smtClean="0"/>
-              <a:t>10/06/2016</a:t>
+              <a:t>03/07/2016</a:t>
             </a:fld>
             <a:endParaRPr lang="es-ES"/>
           </a:p>
@@ -2254,7 +2692,7 @@
           <a:p>
             <a:fld id="{F56AF053-A88D-4829-ACFF-9DF5CBA71A26}" type="datetimeFigureOut">
               <a:rPr lang="es-ES" smtClean="0"/>
-              <a:t>10/06/2016</a:t>
+              <a:t>03/07/2016</a:t>
             </a:fld>
             <a:endParaRPr lang="es-ES"/>
           </a:p>
@@ -2507,7 +2945,7 @@
           <a:p>
             <a:fld id="{F56AF053-A88D-4829-ACFF-9DF5CBA71A26}" type="datetimeFigureOut">
               <a:rPr lang="es-ES" smtClean="0"/>
-              <a:t>10/06/2016</a:t>
+              <a:t>03/07/2016</a:t>
             </a:fld>
             <a:endParaRPr lang="es-ES"/>
           </a:p>
@@ -2720,7 +3158,7 @@
           <a:p>
             <a:fld id="{F56AF053-A88D-4829-ACFF-9DF5CBA71A26}" type="datetimeFigureOut">
               <a:rPr lang="es-ES" smtClean="0"/>
-              <a:t>10/06/2016</a:t>
+              <a:t>03/07/2016</a:t>
             </a:fld>
             <a:endParaRPr lang="es-ES"/>
           </a:p>
@@ -3097,7 +3535,7 @@
       </p:grpSpPr>
       <p:pic>
         <p:nvPicPr>
-          <p:cNvPr id="1026" name="Picture 2" descr="D:\disco_usuario\javier\upm\doctorado\tesis\codigo\k-analysis\graphs\histo_corr_rewiring_mininteractions1_EN.png"/>
+          <p:cNvPr id="1028" name="Picture 4" descr="D:\disco_usuario\javier\upm\doctorado\tesis\codigo\k-analysis\results_rnd\figs\z_M_PL_038_rewire_Binary_EN_model_5.png"/>
           <p:cNvPicPr>
             <a:picLocks noChangeAspect="1" noChangeArrowheads="1"/>
           </p:cNvPicPr>
@@ -3105,88 +3543,6 @@
         </p:nvPicPr>
         <p:blipFill>
           <a:blip r:embed="rId2" cstate="print">
-            <a:extLst>
-              <a:ext uri="{28A0092B-C50C-407E-A947-70E740481C1C}">
-                <a14:useLocalDpi xmlns:a14="http://schemas.microsoft.com/office/drawing/2010/main" val="0"/>
-              </a:ext>
-            </a:extLst>
-          </a:blip>
-          <a:srcRect/>
-          <a:stretch>
-            <a:fillRect/>
-          </a:stretch>
-        </p:blipFill>
-        <p:spPr bwMode="auto">
-          <a:xfrm>
-            <a:off x="-10423" y="188640"/>
-            <a:ext cx="4828042" cy="3017526"/>
-          </a:xfrm>
-          <a:prstGeom prst="rect">
-            <a:avLst/>
-          </a:prstGeom>
-          <a:noFill/>
-          <a:extLst>
-            <a:ext uri="{909E8E84-426E-40DD-AFC4-6F175D3DCCD1}">
-              <a14:hiddenFill xmlns:a14="http://schemas.microsoft.com/office/drawing/2010/main">
-                <a:solidFill>
-                  <a:srgbClr val="FFFFFF"/>
-                </a:solidFill>
-              </a14:hiddenFill>
-            </a:ext>
-          </a:extLst>
-        </p:spPr>
-      </p:pic>
-      <p:pic>
-        <p:nvPicPr>
-          <p:cNvPr id="1027" name="Picture 3" descr="D:\disco_usuario\javier\upm\doctorado\tesis\codigo\k-analysis\graphs\histo_corr_rewiring_mininteractions100_EN.png"/>
-          <p:cNvPicPr>
-            <a:picLocks noChangeAspect="1" noChangeArrowheads="1"/>
-          </p:cNvPicPr>
-          <p:nvPr/>
-        </p:nvPicPr>
-        <p:blipFill>
-          <a:blip r:embed="rId3" cstate="print">
-            <a:extLst>
-              <a:ext uri="{28A0092B-C50C-407E-A947-70E740481C1C}">
-                <a14:useLocalDpi xmlns:a14="http://schemas.microsoft.com/office/drawing/2010/main" val="0"/>
-              </a:ext>
-            </a:extLst>
-          </a:blip>
-          <a:srcRect/>
-          <a:stretch>
-            <a:fillRect/>
-          </a:stretch>
-        </p:blipFill>
-        <p:spPr bwMode="auto">
-          <a:xfrm>
-            <a:off x="-36512" y="3455242"/>
-            <a:ext cx="4828042" cy="3017526"/>
-          </a:xfrm>
-          <a:prstGeom prst="rect">
-            <a:avLst/>
-          </a:prstGeom>
-          <a:noFill/>
-          <a:extLst>
-            <a:ext uri="{909E8E84-426E-40DD-AFC4-6F175D3DCCD1}">
-              <a14:hiddenFill xmlns:a14="http://schemas.microsoft.com/office/drawing/2010/main">
-                <a:solidFill>
-                  <a:srgbClr val="FFFFFF"/>
-                </a:solidFill>
-              </a14:hiddenFill>
-            </a:ext>
-          </a:extLst>
-        </p:spPr>
-      </p:pic>
-      <p:pic>
-        <p:nvPicPr>
-          <p:cNvPr id="1028" name="Picture 4" descr="D:\disco_usuario\javier\upm\doctorado\tesis\codigo\k-analysis\results_rnd\figs\z_M_PL_038_rewire_Binary_EN_model_5.png"/>
-          <p:cNvPicPr>
-            <a:picLocks noChangeAspect="1" noChangeArrowheads="1"/>
-          </p:cNvPicPr>
-          <p:nvPr/>
-        </p:nvPicPr>
-        <p:blipFill>
-          <a:blip r:embed="rId4" cstate="print">
             <a:extLst>
               <a:ext uri="{28A0092B-C50C-407E-A947-70E740481C1C}">
                 <a14:useLocalDpi xmlns:a14="http://schemas.microsoft.com/office/drawing/2010/main" val="0"/>
@@ -3227,7 +3583,7 @@
           <p:nvPr/>
         </p:nvPicPr>
         <p:blipFill>
-          <a:blip r:embed="rId5" cstate="print">
+          <a:blip r:embed="rId3" cstate="print">
             <a:extLst>
               <a:ext uri="{28A0092B-C50C-407E-A947-70E740481C1C}">
                 <a14:useLocalDpi xmlns:a14="http://schemas.microsoft.com/office/drawing/2010/main" val="0"/>
@@ -3259,10 +3615,293 @@
           </a:extLst>
         </p:spPr>
       </p:pic>
+      <p:pic>
+        <p:nvPicPr>
+          <p:cNvPr id="2055" name="Picture 7" descr="D:\disco_usuario\javier\upm\doctorado\tesis\codigo\k-analysis\graphs\histo_corr_rewiring_mininteractions1_EN.png"/>
+          <p:cNvPicPr>
+            <a:picLocks noChangeAspect="1" noChangeArrowheads="1"/>
+          </p:cNvPicPr>
+          <p:nvPr/>
+        </p:nvPicPr>
+        <p:blipFill>
+          <a:blip r:embed="rId4" cstate="print">
+            <a:extLst>
+              <a:ext uri="{28A0092B-C50C-407E-A947-70E740481C1C}">
+                <a14:useLocalDpi xmlns:a14="http://schemas.microsoft.com/office/drawing/2010/main" val="0"/>
+              </a:ext>
+            </a:extLst>
+          </a:blip>
+          <a:srcRect/>
+          <a:stretch>
+            <a:fillRect/>
+          </a:stretch>
+        </p:blipFill>
+        <p:spPr bwMode="auto">
+          <a:xfrm>
+            <a:off x="107504" y="267458"/>
+            <a:ext cx="4828042" cy="3017526"/>
+          </a:xfrm>
+          <a:prstGeom prst="rect">
+            <a:avLst/>
+          </a:prstGeom>
+          <a:noFill/>
+          <a:extLst>
+            <a:ext uri="{909E8E84-426E-40DD-AFC4-6F175D3DCCD1}">
+              <a14:hiddenFill xmlns:a14="http://schemas.microsoft.com/office/drawing/2010/main">
+                <a:solidFill>
+                  <a:srgbClr val="FFFFFF"/>
+                </a:solidFill>
+              </a14:hiddenFill>
+            </a:ext>
+          </a:extLst>
+        </p:spPr>
+      </p:pic>
+      <p:pic>
+        <p:nvPicPr>
+          <p:cNvPr id="2056" name="Picture 8" descr="D:\disco_usuario\javier\upm\doctorado\tesis\codigo\k-analysis\graphs\histo_corr_rewiring_mininteractions100_EN.png"/>
+          <p:cNvPicPr>
+            <a:picLocks noChangeAspect="1" noChangeArrowheads="1"/>
+          </p:cNvPicPr>
+          <p:nvPr/>
+        </p:nvPicPr>
+        <p:blipFill>
+          <a:blip r:embed="rId5" cstate="print">
+            <a:extLst>
+              <a:ext uri="{28A0092B-C50C-407E-A947-70E740481C1C}">
+                <a14:useLocalDpi xmlns:a14="http://schemas.microsoft.com/office/drawing/2010/main" val="0"/>
+              </a:ext>
+            </a:extLst>
+          </a:blip>
+          <a:srcRect/>
+          <a:stretch>
+            <a:fillRect/>
+          </a:stretch>
+        </p:blipFill>
+        <p:spPr bwMode="auto">
+          <a:xfrm>
+            <a:off x="103998" y="3501008"/>
+            <a:ext cx="4828042" cy="3017526"/>
+          </a:xfrm>
+          <a:prstGeom prst="rect">
+            <a:avLst/>
+          </a:prstGeom>
+          <a:noFill/>
+          <a:extLst>
+            <a:ext uri="{909E8E84-426E-40DD-AFC4-6F175D3DCCD1}">
+              <a14:hiddenFill xmlns:a14="http://schemas.microsoft.com/office/drawing/2010/main">
+                <a:solidFill>
+                  <a:srgbClr val="FFFFFF"/>
+                </a:solidFill>
+              </a14:hiddenFill>
+            </a:ext>
+          </a:extLst>
+        </p:spPr>
+      </p:pic>
     </p:spTree>
     <p:extLst>
       <p:ext uri="{BB962C8B-B14F-4D97-AF65-F5344CB8AC3E}">
         <p14:creationId xmlns:p14="http://schemas.microsoft.com/office/powerpoint/2010/main" val="571006211"/>
+      </p:ext>
+    </p:extLst>
+  </p:cSld>
+  <p:clrMapOvr>
+    <a:masterClrMapping/>
+  </p:clrMapOvr>
+  <p:timing>
+    <p:tnLst>
+      <p:par>
+        <p:cTn id="1" dur="indefinite" restart="never" nodeType="tmRoot"/>
+      </p:par>
+    </p:tnLst>
+  </p:timing>
+</p:sld>
+</file>
+
+<file path=ppt/slides/slide2.xml><?xml version="1.0" encoding="utf-8"?>
+<p:sld xmlns:a="http://schemas.openxmlformats.org/drawingml/2006/main" xmlns:r="http://schemas.openxmlformats.org/officeDocument/2006/relationships" xmlns:p="http://schemas.openxmlformats.org/presentationml/2006/main">
+  <p:cSld>
+    <p:spTree>
+      <p:nvGrpSpPr>
+        <p:cNvPr id="1" name=""/>
+        <p:cNvGrpSpPr/>
+        <p:nvPr/>
+      </p:nvGrpSpPr>
+      <p:grpSpPr>
+        <a:xfrm>
+          <a:off x="0" y="0"/>
+          <a:ext cx="0" cy="0"/>
+          <a:chOff x="0" y="0"/>
+          <a:chExt cx="0" cy="0"/>
+        </a:xfrm>
+      </p:grpSpPr>
+      <p:pic>
+        <p:nvPicPr>
+          <p:cNvPr id="1028" name="Picture 4" descr="D:\disco_usuario\javier\upm\doctorado\tesis\codigo\k-analysis\results_rnd\figs\z_M_PL_038_rewire_Binary_EN_model_5.png"/>
+          <p:cNvPicPr>
+            <a:picLocks noChangeAspect="1" noChangeArrowheads="1"/>
+          </p:cNvPicPr>
+          <p:nvPr/>
+        </p:nvPicPr>
+        <p:blipFill>
+          <a:blip r:embed="rId3" cstate="print">
+            <a:extLst>
+              <a:ext uri="{28A0092B-C50C-407E-A947-70E740481C1C}">
+                <a14:useLocalDpi xmlns:a14="http://schemas.microsoft.com/office/drawing/2010/main" val="0"/>
+              </a:ext>
+            </a:extLst>
+          </a:blip>
+          <a:srcRect/>
+          <a:stretch>
+            <a:fillRect/>
+          </a:stretch>
+        </p:blipFill>
+        <p:spPr bwMode="auto">
+          <a:xfrm>
+            <a:off x="4788024" y="358898"/>
+            <a:ext cx="4389129" cy="2926086"/>
+          </a:xfrm>
+          <a:prstGeom prst="rect">
+            <a:avLst/>
+          </a:prstGeom>
+          <a:noFill/>
+          <a:extLst>
+            <a:ext uri="{909E8E84-426E-40DD-AFC4-6F175D3DCCD1}">
+              <a14:hiddenFill xmlns:a14="http://schemas.microsoft.com/office/drawing/2010/main">
+                <a:solidFill>
+                  <a:srgbClr val="FFFFFF"/>
+                </a:solidFill>
+              </a14:hiddenFill>
+            </a:ext>
+          </a:extLst>
+        </p:spPr>
+      </p:pic>
+      <p:pic>
+        <p:nvPicPr>
+          <p:cNvPr id="1029" name="Picture 5" descr="D:\disco_usuario\javier\upm\doctorado\tesis\codigo\k-analysis\results_rnd\figs\z_M_PL_010_rewire_Binary_EN_model_5.png"/>
+          <p:cNvPicPr>
+            <a:picLocks noChangeAspect="1" noChangeArrowheads="1"/>
+          </p:cNvPicPr>
+          <p:nvPr/>
+        </p:nvPicPr>
+        <p:blipFill>
+          <a:blip r:embed="rId4" cstate="print">
+            <a:extLst>
+              <a:ext uri="{28A0092B-C50C-407E-A947-70E740481C1C}">
+                <a14:useLocalDpi xmlns:a14="http://schemas.microsoft.com/office/drawing/2010/main" val="0"/>
+              </a:ext>
+            </a:extLst>
+          </a:blip>
+          <a:srcRect/>
+          <a:stretch>
+            <a:fillRect/>
+          </a:stretch>
+        </p:blipFill>
+        <p:spPr bwMode="auto">
+          <a:xfrm>
+            <a:off x="4788024" y="3671266"/>
+            <a:ext cx="4389129" cy="2926086"/>
+          </a:xfrm>
+          <a:prstGeom prst="rect">
+            <a:avLst/>
+          </a:prstGeom>
+          <a:noFill/>
+          <a:extLst>
+            <a:ext uri="{909E8E84-426E-40DD-AFC4-6F175D3DCCD1}">
+              <a14:hiddenFill xmlns:a14="http://schemas.microsoft.com/office/drawing/2010/main">
+                <a:solidFill>
+                  <a:srgbClr val="FFFFFF"/>
+                </a:solidFill>
+              </a14:hiddenFill>
+            </a:ext>
+          </a:extLst>
+        </p:spPr>
+      </p:pic>
+      <p:pic>
+        <p:nvPicPr>
+          <p:cNvPr id="1034" name="Picture 10" descr="D:\disco_usuario\javier\upm\doctorado\tesis\codigo\k-analysis\graphs\histo_corr_rewiring_mininteractions1_ES.png"/>
+          <p:cNvPicPr>
+            <a:picLocks noChangeAspect="1" noChangeArrowheads="1"/>
+          </p:cNvPicPr>
+          <p:nvPr/>
+        </p:nvPicPr>
+        <p:blipFill>
+          <a:blip r:embed="rId5" cstate="print">
+            <a:extLst>
+              <a:ext uri="{28A0092B-C50C-407E-A947-70E740481C1C}">
+                <a14:useLocalDpi xmlns:a14="http://schemas.microsoft.com/office/drawing/2010/main" val="0"/>
+              </a:ext>
+            </a:extLst>
+          </a:blip>
+          <a:srcRect/>
+          <a:stretch>
+            <a:fillRect/>
+          </a:stretch>
+        </p:blipFill>
+        <p:spPr bwMode="auto">
+          <a:xfrm>
+            <a:off x="19930" y="313178"/>
+            <a:ext cx="4828042" cy="3017526"/>
+          </a:xfrm>
+          <a:prstGeom prst="rect">
+            <a:avLst/>
+          </a:prstGeom>
+          <a:noFill/>
+          <a:extLst>
+            <a:ext uri="{909E8E84-426E-40DD-AFC4-6F175D3DCCD1}">
+              <a14:hiddenFill xmlns:a14="http://schemas.microsoft.com/office/drawing/2010/main">
+                <a:solidFill>
+                  <a:srgbClr val="FFFFFF"/>
+                </a:solidFill>
+              </a14:hiddenFill>
+            </a:ext>
+          </a:extLst>
+        </p:spPr>
+      </p:pic>
+      <p:pic>
+        <p:nvPicPr>
+          <p:cNvPr id="1035" name="Picture 11" descr="D:\disco_usuario\javier\upm\doctorado\tesis\codigo\k-analysis\graphs\histo_corr_rewiring_mininteractions100_ES.png"/>
+          <p:cNvPicPr>
+            <a:picLocks noChangeAspect="1" noChangeArrowheads="1"/>
+          </p:cNvPicPr>
+          <p:nvPr/>
+        </p:nvPicPr>
+        <p:blipFill>
+          <a:blip r:embed="rId6" cstate="print">
+            <a:extLst>
+              <a:ext uri="{28A0092B-C50C-407E-A947-70E740481C1C}">
+                <a14:useLocalDpi xmlns:a14="http://schemas.microsoft.com/office/drawing/2010/main" val="0"/>
+              </a:ext>
+            </a:extLst>
+          </a:blip>
+          <a:srcRect/>
+          <a:stretch>
+            <a:fillRect/>
+          </a:stretch>
+        </p:blipFill>
+        <p:spPr bwMode="auto">
+          <a:xfrm>
+            <a:off x="31990" y="3573016"/>
+            <a:ext cx="4828042" cy="3017526"/>
+          </a:xfrm>
+          <a:prstGeom prst="rect">
+            <a:avLst/>
+          </a:prstGeom>
+          <a:noFill/>
+          <a:extLst>
+            <a:ext uri="{909E8E84-426E-40DD-AFC4-6F175D3DCCD1}">
+              <a14:hiddenFill xmlns:a14="http://schemas.microsoft.com/office/drawing/2010/main">
+                <a:solidFill>
+                  <a:srgbClr val="FFFFFF"/>
+                </a:solidFill>
+              </a14:hiddenFill>
+            </a:ext>
+          </a:extLst>
+        </p:spPr>
+      </p:pic>
+    </p:spTree>
+    <p:extLst>
+      <p:ext uri="{BB962C8B-B14F-4D97-AF65-F5344CB8AC3E}">
+        <p14:creationId xmlns:p14="http://schemas.microsoft.com/office/powerpoint/2010/main" val="477334603"/>
       </p:ext>
     </p:extLst>
   </p:cSld>
@@ -3562,4 +4201,289 @@
   <a:objectDefaults/>
   <a:extraClrSchemeLst/>
 </a:theme>
+</file>
+
+<file path=ppt/theme/theme2.xml><?xml version="1.0" encoding="utf-8"?>
+<a:theme xmlns:a="http://schemas.openxmlformats.org/drawingml/2006/main" name="Tema de Office">
+  <a:themeElements>
+    <a:clrScheme name="Office">
+      <a:dk1>
+        <a:sysClr val="windowText" lastClr="000000"/>
+      </a:dk1>
+      <a:lt1>
+        <a:sysClr val="window" lastClr="FFFFFF"/>
+      </a:lt1>
+      <a:dk2>
+        <a:srgbClr val="1F497D"/>
+      </a:dk2>
+      <a:lt2>
+        <a:srgbClr val="EEECE1"/>
+      </a:lt2>
+      <a:accent1>
+        <a:srgbClr val="4F81BD"/>
+      </a:accent1>
+      <a:accent2>
+        <a:srgbClr val="C0504D"/>
+      </a:accent2>
+      <a:accent3>
+        <a:srgbClr val="9BBB59"/>
+      </a:accent3>
+      <a:accent4>
+        <a:srgbClr val="8064A2"/>
+      </a:accent4>
+      <a:accent5>
+        <a:srgbClr val="4BACC6"/>
+      </a:accent5>
+      <a:accent6>
+        <a:srgbClr val="F79646"/>
+      </a:accent6>
+      <a:hlink>
+        <a:srgbClr val="0000FF"/>
+      </a:hlink>
+      <a:folHlink>
+        <a:srgbClr val="800080"/>
+      </a:folHlink>
+    </a:clrScheme>
+    <a:fontScheme name="Office">
+      <a:majorFont>
+        <a:latin typeface="Calibri"/>
+        <a:ea typeface=""/>
+        <a:cs typeface=""/>
+        <a:font script="Jpan" typeface="ＭＳ Ｐゴシック"/>
+        <a:font script="Hang" typeface="맑은 고딕"/>
+        <a:font script="Hans" typeface="宋体"/>
+        <a:font script="Hant" typeface="新細明體"/>
+        <a:font script="Arab" typeface="Times New Roman"/>
+        <a:font script="Hebr" typeface="Times New Roman"/>
+        <a:font script="Thai" typeface="Angsana New"/>
+        <a:font script="Ethi" typeface="Nyala"/>
+        <a:font script="Beng" typeface="Vrinda"/>
+        <a:font script="Gujr" typeface="Shruti"/>
+        <a:font script="Khmr" typeface="MoolBoran"/>
+        <a:font script="Knda" typeface="Tunga"/>
+        <a:font script="Guru" typeface="Raavi"/>
+        <a:font script="Cans" typeface="Euphemia"/>
+        <a:font script="Cher" typeface="Plantagenet Cherokee"/>
+        <a:font script="Yiii" typeface="Microsoft Yi Baiti"/>
+        <a:font script="Tibt" typeface="Microsoft Himalaya"/>
+        <a:font script="Thaa" typeface="MV Boli"/>
+        <a:font script="Deva" typeface="Mangal"/>
+        <a:font script="Telu" typeface="Gautami"/>
+        <a:font script="Taml" typeface="Latha"/>
+        <a:font script="Syrc" typeface="Estrangelo Edessa"/>
+        <a:font script="Orya" typeface="Kalinga"/>
+        <a:font script="Mlym" typeface="Kartika"/>
+        <a:font script="Laoo" typeface="DokChampa"/>
+        <a:font script="Sinh" typeface="Iskoola Pota"/>
+        <a:font script="Mong" typeface="Mongolian Baiti"/>
+        <a:font script="Viet" typeface="Times New Roman"/>
+        <a:font script="Uigh" typeface="Microsoft Uighur"/>
+        <a:font script="Geor" typeface="Sylfaen"/>
+      </a:majorFont>
+      <a:minorFont>
+        <a:latin typeface="Calibri"/>
+        <a:ea typeface=""/>
+        <a:cs typeface=""/>
+        <a:font script="Jpan" typeface="ＭＳ Ｐゴシック"/>
+        <a:font script="Hang" typeface="맑은 고딕"/>
+        <a:font script="Hans" typeface="宋体"/>
+        <a:font script="Hant" typeface="新細明體"/>
+        <a:font script="Arab" typeface="Arial"/>
+        <a:font script="Hebr" typeface="Arial"/>
+        <a:font script="Thai" typeface="Cordia New"/>
+        <a:font script="Ethi" typeface="Nyala"/>
+        <a:font script="Beng" typeface="Vrinda"/>
+        <a:font script="Gujr" typeface="Shruti"/>
+        <a:font script="Khmr" typeface="DaunPenh"/>
+        <a:font script="Knda" typeface="Tunga"/>
+        <a:font script="Guru" typeface="Raavi"/>
+        <a:font script="Cans" typeface="Euphemia"/>
+        <a:font script="Cher" typeface="Plantagenet Cherokee"/>
+        <a:font script="Yiii" typeface="Microsoft Yi Baiti"/>
+        <a:font script="Tibt" typeface="Microsoft Himalaya"/>
+        <a:font script="Thaa" typeface="MV Boli"/>
+        <a:font script="Deva" typeface="Mangal"/>
+        <a:font script="Telu" typeface="Gautami"/>
+        <a:font script="Taml" typeface="Latha"/>
+        <a:font script="Syrc" typeface="Estrangelo Edessa"/>
+        <a:font script="Orya" typeface="Kalinga"/>
+        <a:font script="Mlym" typeface="Kartika"/>
+        <a:font script="Laoo" typeface="DokChampa"/>
+        <a:font script="Sinh" typeface="Iskoola Pota"/>
+        <a:font script="Mong" typeface="Mongolian Baiti"/>
+        <a:font script="Viet" typeface="Arial"/>
+        <a:font script="Uigh" typeface="Microsoft Uighur"/>
+        <a:font script="Geor" typeface="Sylfaen"/>
+      </a:minorFont>
+    </a:fontScheme>
+    <a:fmtScheme name="Office">
+      <a:fillStyleLst>
+        <a:solidFill>
+          <a:schemeClr val="phClr"/>
+        </a:solidFill>
+        <a:gradFill rotWithShape="1">
+          <a:gsLst>
+            <a:gs pos="0">
+              <a:schemeClr val="phClr">
+                <a:tint val="50000"/>
+                <a:satMod val="300000"/>
+              </a:schemeClr>
+            </a:gs>
+            <a:gs pos="35000">
+              <a:schemeClr val="phClr">
+                <a:tint val="37000"/>
+                <a:satMod val="300000"/>
+              </a:schemeClr>
+            </a:gs>
+            <a:gs pos="100000">
+              <a:schemeClr val="phClr">
+                <a:tint val="15000"/>
+                <a:satMod val="350000"/>
+              </a:schemeClr>
+            </a:gs>
+          </a:gsLst>
+          <a:lin ang="16200000" scaled="1"/>
+        </a:gradFill>
+        <a:gradFill rotWithShape="1">
+          <a:gsLst>
+            <a:gs pos="0">
+              <a:schemeClr val="phClr">
+                <a:shade val="51000"/>
+                <a:satMod val="130000"/>
+              </a:schemeClr>
+            </a:gs>
+            <a:gs pos="80000">
+              <a:schemeClr val="phClr">
+                <a:shade val="93000"/>
+                <a:satMod val="130000"/>
+              </a:schemeClr>
+            </a:gs>
+            <a:gs pos="100000">
+              <a:schemeClr val="phClr">
+                <a:shade val="94000"/>
+                <a:satMod val="135000"/>
+              </a:schemeClr>
+            </a:gs>
+          </a:gsLst>
+          <a:lin ang="16200000" scaled="0"/>
+        </a:gradFill>
+      </a:fillStyleLst>
+      <a:lnStyleLst>
+        <a:ln w="9525" cap="flat" cmpd="sng" algn="ctr">
+          <a:solidFill>
+            <a:schemeClr val="phClr">
+              <a:shade val="95000"/>
+              <a:satMod val="105000"/>
+            </a:schemeClr>
+          </a:solidFill>
+          <a:prstDash val="solid"/>
+        </a:ln>
+        <a:ln w="25400" cap="flat" cmpd="sng" algn="ctr">
+          <a:solidFill>
+            <a:schemeClr val="phClr"/>
+          </a:solidFill>
+          <a:prstDash val="solid"/>
+        </a:ln>
+        <a:ln w="38100" cap="flat" cmpd="sng" algn="ctr">
+          <a:solidFill>
+            <a:schemeClr val="phClr"/>
+          </a:solidFill>
+          <a:prstDash val="solid"/>
+        </a:ln>
+      </a:lnStyleLst>
+      <a:effectStyleLst>
+        <a:effectStyle>
+          <a:effectLst>
+            <a:outerShdw blurRad="40000" dist="20000" dir="5400000" rotWithShape="0">
+              <a:srgbClr val="000000">
+                <a:alpha val="38000"/>
+              </a:srgbClr>
+            </a:outerShdw>
+          </a:effectLst>
+        </a:effectStyle>
+        <a:effectStyle>
+          <a:effectLst>
+            <a:outerShdw blurRad="40000" dist="23000" dir="5400000" rotWithShape="0">
+              <a:srgbClr val="000000">
+                <a:alpha val="35000"/>
+              </a:srgbClr>
+            </a:outerShdw>
+          </a:effectLst>
+        </a:effectStyle>
+        <a:effectStyle>
+          <a:effectLst>
+            <a:outerShdw blurRad="40000" dist="23000" dir="5400000" rotWithShape="0">
+              <a:srgbClr val="000000">
+                <a:alpha val="35000"/>
+              </a:srgbClr>
+            </a:outerShdw>
+          </a:effectLst>
+          <a:scene3d>
+            <a:camera prst="orthographicFront">
+              <a:rot lat="0" lon="0" rev="0"/>
+            </a:camera>
+            <a:lightRig rig="threePt" dir="t">
+              <a:rot lat="0" lon="0" rev="1200000"/>
+            </a:lightRig>
+          </a:scene3d>
+          <a:sp3d>
+            <a:bevelT w="63500" h="25400"/>
+          </a:sp3d>
+        </a:effectStyle>
+      </a:effectStyleLst>
+      <a:bgFillStyleLst>
+        <a:solidFill>
+          <a:schemeClr val="phClr"/>
+        </a:solidFill>
+        <a:gradFill rotWithShape="1">
+          <a:gsLst>
+            <a:gs pos="0">
+              <a:schemeClr val="phClr">
+                <a:tint val="40000"/>
+                <a:satMod val="350000"/>
+              </a:schemeClr>
+            </a:gs>
+            <a:gs pos="40000">
+              <a:schemeClr val="phClr">
+                <a:tint val="45000"/>
+                <a:shade val="99000"/>
+                <a:satMod val="350000"/>
+              </a:schemeClr>
+            </a:gs>
+            <a:gs pos="100000">
+              <a:schemeClr val="phClr">
+                <a:shade val="20000"/>
+                <a:satMod val="255000"/>
+              </a:schemeClr>
+            </a:gs>
+          </a:gsLst>
+          <a:path path="circle">
+            <a:fillToRect l="50000" t="-80000" r="50000" b="180000"/>
+          </a:path>
+        </a:gradFill>
+        <a:gradFill rotWithShape="1">
+          <a:gsLst>
+            <a:gs pos="0">
+              <a:schemeClr val="phClr">
+                <a:tint val="80000"/>
+                <a:satMod val="300000"/>
+              </a:schemeClr>
+            </a:gs>
+            <a:gs pos="100000">
+              <a:schemeClr val="phClr">
+                <a:shade val="30000"/>
+                <a:satMod val="200000"/>
+              </a:schemeClr>
+            </a:gs>
+          </a:gsLst>
+          <a:path path="circle">
+            <a:fillToRect l="50000" t="50000" r="50000" b="50000"/>
+          </a:path>
+        </a:gradFill>
+      </a:bgFillStyleLst>
+    </a:fmtScheme>
+  </a:themeElements>
+  <a:objectDefaults/>
+  <a:extraClrSchemeLst/>
+</a:theme>
 </file>
</xml_diff>